<commit_message>
Chap03: Corrections done until III.2.4
</commit_message>
<xml_diff>
--- a/03-h-Mn/Pictures/DarkRelax.pptx
+++ b/03-h-Mn/Pictures/DarkRelax.pptx
@@ -10,7 +10,7 @@
   <p:sldIdLst>
     <p:sldId id="293" r:id="rId2"/>
   </p:sldIdLst>
-  <p:sldSz cx="6121400" cy="5148263"/>
+  <p:sldSz cx="6300788" cy="5148263"/>
   <p:notesSz cx="6797675" cy="9926638"/>
   <p:defaultTextStyle>
     <a:defPPr>
@@ -192,7 +192,7 @@
           <a:p>
             <a:fld id="{A732596A-CC33-44AB-A517-CD91BCF05E15}" type="datetimeFigureOut">
               <a:rPr lang="en-US" smtClean="0"/>
-              <a:t>7/12/2017</a:t>
+              <a:t>10/16/2017</a:t>
             </a:fld>
             <a:endParaRPr lang="en-US"/>
           </a:p>
@@ -210,8 +210,8 @@
         </p:nvSpPr>
         <p:spPr>
           <a:xfrm>
-            <a:off x="1185863" y="744538"/>
-            <a:ext cx="4425950" cy="3721100"/>
+            <a:off x="1122363" y="744538"/>
+            <a:ext cx="4552950" cy="3721100"/>
           </a:xfrm>
           <a:prstGeom prst="rect">
             <a:avLst/>
@@ -489,8 +489,8 @@
         </p:nvSpPr>
         <p:spPr>
           <a:xfrm>
-            <a:off x="459105" y="1599301"/>
-            <a:ext cx="5203190" cy="1103539"/>
+            <a:off x="472559" y="1599302"/>
+            <a:ext cx="5355670" cy="1103539"/>
           </a:xfrm>
         </p:spPr>
         <p:txBody>
@@ -517,8 +517,8 @@
         </p:nvSpPr>
         <p:spPr>
           <a:xfrm>
-            <a:off x="918210" y="2917352"/>
-            <a:ext cx="4284980" cy="1315667"/>
+            <a:off x="945118" y="2917353"/>
+            <a:ext cx="4410552" cy="1315667"/>
           </a:xfrm>
         </p:spPr>
         <p:txBody>
@@ -641,7 +641,7 @@
           <a:p>
             <a:fld id="{252CF840-51FB-49D9-ADDC-0C52DA34DC77}" type="datetimeFigureOut">
               <a:rPr lang="en-US" smtClean="0"/>
-              <a:t>7/12/2017</a:t>
+              <a:t>10/16/2017</a:t>
             </a:fld>
             <a:endParaRPr lang="en-US"/>
           </a:p>
@@ -811,7 +811,7 @@
           <a:p>
             <a:fld id="{252CF840-51FB-49D9-ADDC-0C52DA34DC77}" type="datetimeFigureOut">
               <a:rPr lang="en-US" smtClean="0"/>
-              <a:t>7/12/2017</a:t>
+              <a:t>10/16/2017</a:t>
             </a:fld>
             <a:endParaRPr lang="en-US"/>
           </a:p>
@@ -901,8 +901,8 @@
         </p:nvSpPr>
         <p:spPr>
           <a:xfrm>
-            <a:off x="4438020" y="206173"/>
-            <a:ext cx="1377315" cy="4392707"/>
+            <a:off x="4568077" y="206174"/>
+            <a:ext cx="1417677" cy="4392707"/>
           </a:xfrm>
         </p:spPr>
         <p:txBody>
@@ -929,8 +929,8 @@
         </p:nvSpPr>
         <p:spPr>
           <a:xfrm>
-            <a:off x="306070" y="206173"/>
-            <a:ext cx="4029922" cy="4392707"/>
+            <a:off x="315039" y="206174"/>
+            <a:ext cx="4148019" cy="4392707"/>
           </a:xfrm>
         </p:spPr>
         <p:txBody>
@@ -991,7 +991,7 @@
           <a:p>
             <a:fld id="{252CF840-51FB-49D9-ADDC-0C52DA34DC77}" type="datetimeFigureOut">
               <a:rPr lang="en-US" smtClean="0"/>
-              <a:t>7/12/2017</a:t>
+              <a:t>10/16/2017</a:t>
             </a:fld>
             <a:endParaRPr lang="en-US"/>
           </a:p>
@@ -1161,7 +1161,7 @@
           <a:p>
             <a:fld id="{252CF840-51FB-49D9-ADDC-0C52DA34DC77}" type="datetimeFigureOut">
               <a:rPr lang="en-US" smtClean="0"/>
-              <a:t>7/12/2017</a:t>
+              <a:t>10/16/2017</a:t>
             </a:fld>
             <a:endParaRPr lang="en-US"/>
           </a:p>
@@ -1251,8 +1251,8 @@
         </p:nvSpPr>
         <p:spPr>
           <a:xfrm>
-            <a:off x="483549" y="3308236"/>
-            <a:ext cx="5203190" cy="1022503"/>
+            <a:off x="497719" y="3308237"/>
+            <a:ext cx="5355670" cy="1022503"/>
           </a:xfrm>
         </p:spPr>
         <p:txBody>
@@ -1283,8 +1283,8 @@
         </p:nvSpPr>
         <p:spPr>
           <a:xfrm>
-            <a:off x="483549" y="2182056"/>
-            <a:ext cx="5203190" cy="1126182"/>
+            <a:off x="497719" y="2182056"/>
+            <a:ext cx="5355670" cy="1126182"/>
           </a:xfrm>
         </p:spPr>
         <p:txBody>
@@ -1407,7 +1407,7 @@
           <a:p>
             <a:fld id="{252CF840-51FB-49D9-ADDC-0C52DA34DC77}" type="datetimeFigureOut">
               <a:rPr lang="en-US" smtClean="0"/>
-              <a:t>7/12/2017</a:t>
+              <a:t>10/16/2017</a:t>
             </a:fld>
             <a:endParaRPr lang="en-US"/>
           </a:p>
@@ -1520,8 +1520,8 @@
         </p:nvSpPr>
         <p:spPr>
           <a:xfrm>
-            <a:off x="306070" y="1201263"/>
-            <a:ext cx="2703618" cy="3397616"/>
+            <a:off x="315039" y="1201263"/>
+            <a:ext cx="2782848" cy="3397616"/>
           </a:xfrm>
         </p:spPr>
         <p:txBody>
@@ -1605,8 +1605,8 @@
         </p:nvSpPr>
         <p:spPr>
           <a:xfrm>
-            <a:off x="3111712" y="1201263"/>
-            <a:ext cx="2703618" cy="3397616"/>
+            <a:off x="3202901" y="1201263"/>
+            <a:ext cx="2782848" cy="3397616"/>
           </a:xfrm>
         </p:spPr>
         <p:txBody>
@@ -1695,7 +1695,7 @@
           <a:p>
             <a:fld id="{252CF840-51FB-49D9-ADDC-0C52DA34DC77}" type="datetimeFigureOut">
               <a:rPr lang="en-US" smtClean="0"/>
-              <a:t>7/12/2017</a:t>
+              <a:t>10/16/2017</a:t>
             </a:fld>
             <a:endParaRPr lang="en-US"/>
           </a:p>
@@ -1812,8 +1812,8 @@
         </p:nvSpPr>
         <p:spPr>
           <a:xfrm>
-            <a:off x="306076" y="1152402"/>
-            <a:ext cx="2704681" cy="480267"/>
+            <a:off x="315046" y="1152403"/>
+            <a:ext cx="2783942" cy="480267"/>
           </a:xfrm>
         </p:spPr>
         <p:txBody>
@@ -1877,8 +1877,8 @@
         </p:nvSpPr>
         <p:spPr>
           <a:xfrm>
-            <a:off x="306076" y="1632669"/>
-            <a:ext cx="2704681" cy="2966210"/>
+            <a:off x="315046" y="1632669"/>
+            <a:ext cx="2783942" cy="2966210"/>
           </a:xfrm>
         </p:spPr>
         <p:txBody>
@@ -1962,8 +1962,8 @@
         </p:nvSpPr>
         <p:spPr>
           <a:xfrm>
-            <a:off x="3109586" y="1152402"/>
-            <a:ext cx="2705744" cy="480267"/>
+            <a:off x="3200713" y="1152403"/>
+            <a:ext cx="2785036" cy="480267"/>
           </a:xfrm>
         </p:spPr>
         <p:txBody>
@@ -2027,8 +2027,8 @@
         </p:nvSpPr>
         <p:spPr>
           <a:xfrm>
-            <a:off x="3109586" y="1632669"/>
-            <a:ext cx="2705744" cy="2966210"/>
+            <a:off x="3200713" y="1632669"/>
+            <a:ext cx="2785036" cy="2966210"/>
           </a:xfrm>
         </p:spPr>
         <p:txBody>
@@ -2117,7 +2117,7 @@
           <a:p>
             <a:fld id="{252CF840-51FB-49D9-ADDC-0C52DA34DC77}" type="datetimeFigureOut">
               <a:rPr lang="en-US" smtClean="0"/>
-              <a:t>7/12/2017</a:t>
+              <a:t>10/16/2017</a:t>
             </a:fld>
             <a:endParaRPr lang="en-US"/>
           </a:p>
@@ -2235,7 +2235,7 @@
           <a:p>
             <a:fld id="{252CF840-51FB-49D9-ADDC-0C52DA34DC77}" type="datetimeFigureOut">
               <a:rPr lang="en-US" smtClean="0"/>
-              <a:t>7/12/2017</a:t>
+              <a:t>10/16/2017</a:t>
             </a:fld>
             <a:endParaRPr lang="en-US"/>
           </a:p>
@@ -2330,7 +2330,7 @@
           <a:p>
             <a:fld id="{252CF840-51FB-49D9-ADDC-0C52DA34DC77}" type="datetimeFigureOut">
               <a:rPr lang="en-US" smtClean="0"/>
-              <a:t>7/12/2017</a:t>
+              <a:t>10/16/2017</a:t>
             </a:fld>
             <a:endParaRPr lang="en-US"/>
           </a:p>
@@ -2420,8 +2420,8 @@
         </p:nvSpPr>
         <p:spPr>
           <a:xfrm>
-            <a:off x="306075" y="204979"/>
-            <a:ext cx="2013899" cy="872345"/>
+            <a:off x="315045" y="204980"/>
+            <a:ext cx="2072916" cy="872345"/>
           </a:xfrm>
         </p:spPr>
         <p:txBody>
@@ -2452,8 +2452,8 @@
         </p:nvSpPr>
         <p:spPr>
           <a:xfrm>
-            <a:off x="2393298" y="204980"/>
-            <a:ext cx="3422033" cy="4393900"/>
+            <a:off x="2463434" y="204980"/>
+            <a:ext cx="3522316" cy="4393900"/>
           </a:xfrm>
         </p:spPr>
         <p:txBody>
@@ -2537,8 +2537,8 @@
         </p:nvSpPr>
         <p:spPr>
           <a:xfrm>
-            <a:off x="306075" y="1077323"/>
-            <a:ext cx="2013899" cy="3521555"/>
+            <a:off x="315045" y="1077324"/>
+            <a:ext cx="2072916" cy="3521555"/>
           </a:xfrm>
         </p:spPr>
         <p:txBody>
@@ -2607,7 +2607,7 @@
           <a:p>
             <a:fld id="{252CF840-51FB-49D9-ADDC-0C52DA34DC77}" type="datetimeFigureOut">
               <a:rPr lang="en-US" smtClean="0"/>
-              <a:t>7/12/2017</a:t>
+              <a:t>10/16/2017</a:t>
             </a:fld>
             <a:endParaRPr lang="en-US"/>
           </a:p>
@@ -2697,8 +2697,8 @@
         </p:nvSpPr>
         <p:spPr>
           <a:xfrm>
-            <a:off x="1199837" y="3603784"/>
-            <a:ext cx="3672840" cy="425447"/>
+            <a:off x="1234998" y="3603785"/>
+            <a:ext cx="3780473" cy="425447"/>
           </a:xfrm>
         </p:spPr>
         <p:txBody>
@@ -2729,8 +2729,8 @@
         </p:nvSpPr>
         <p:spPr>
           <a:xfrm>
-            <a:off x="1199837" y="460006"/>
-            <a:ext cx="3672840" cy="3088958"/>
+            <a:off x="1234998" y="460006"/>
+            <a:ext cx="3780473" cy="3088958"/>
           </a:xfrm>
         </p:spPr>
         <p:txBody>
@@ -2790,8 +2790,8 @@
         </p:nvSpPr>
         <p:spPr>
           <a:xfrm>
-            <a:off x="1199837" y="4029233"/>
-            <a:ext cx="3672840" cy="604206"/>
+            <a:off x="1234998" y="4029233"/>
+            <a:ext cx="3780473" cy="604206"/>
           </a:xfrm>
         </p:spPr>
         <p:txBody>
@@ -2860,7 +2860,7 @@
           <a:p>
             <a:fld id="{252CF840-51FB-49D9-ADDC-0C52DA34DC77}" type="datetimeFigureOut">
               <a:rPr lang="en-US" smtClean="0"/>
-              <a:t>7/12/2017</a:t>
+              <a:t>10/16/2017</a:t>
             </a:fld>
             <a:endParaRPr lang="en-US"/>
           </a:p>
@@ -2955,8 +2955,8 @@
         </p:nvSpPr>
         <p:spPr>
           <a:xfrm>
-            <a:off x="306071" y="206170"/>
-            <a:ext cx="5509260" cy="858043"/>
+            <a:off x="315041" y="206171"/>
+            <a:ext cx="5670709" cy="858043"/>
           </a:xfrm>
           <a:prstGeom prst="rect">
             <a:avLst/>
@@ -2988,8 +2988,8 @@
         </p:nvSpPr>
         <p:spPr>
           <a:xfrm>
-            <a:off x="306071" y="1201263"/>
-            <a:ext cx="5509260" cy="3397616"/>
+            <a:off x="315041" y="1201263"/>
+            <a:ext cx="5670709" cy="3397616"/>
           </a:xfrm>
           <a:prstGeom prst="rect">
             <a:avLst/>
@@ -3050,8 +3050,8 @@
         </p:nvSpPr>
         <p:spPr>
           <a:xfrm>
-            <a:off x="306075" y="4771680"/>
-            <a:ext cx="1428327" cy="274097"/>
+            <a:off x="315045" y="4771681"/>
+            <a:ext cx="1470184" cy="274097"/>
           </a:xfrm>
           <a:prstGeom prst="rect">
             <a:avLst/>
@@ -3073,7 +3073,7 @@
           <a:p>
             <a:fld id="{252CF840-51FB-49D9-ADDC-0C52DA34DC77}" type="datetimeFigureOut">
               <a:rPr lang="en-US" smtClean="0"/>
-              <a:t>7/12/2017</a:t>
+              <a:t>10/16/2017</a:t>
             </a:fld>
             <a:endParaRPr lang="en-US"/>
           </a:p>
@@ -3091,8 +3091,8 @@
         </p:nvSpPr>
         <p:spPr>
           <a:xfrm>
-            <a:off x="2091478" y="4771680"/>
-            <a:ext cx="1938444" cy="274097"/>
+            <a:off x="2152769" y="4771681"/>
+            <a:ext cx="1995250" cy="274097"/>
           </a:xfrm>
           <a:prstGeom prst="rect">
             <a:avLst/>
@@ -3128,8 +3128,8 @@
         </p:nvSpPr>
         <p:spPr>
           <a:xfrm>
-            <a:off x="4387008" y="4771680"/>
-            <a:ext cx="1428327" cy="274097"/>
+            <a:off x="4515570" y="4771681"/>
+            <a:ext cx="1470184" cy="274097"/>
           </a:xfrm>
           <a:prstGeom prst="rect">
             <a:avLst/>
@@ -3450,7 +3450,7 @@
       </p:grpSpPr>
       <p:pic>
         <p:nvPicPr>
-          <p:cNvPr id="169" name="Picture 2"/>
+          <p:cNvPr id="26" name="Picture 2"/>
           <p:cNvPicPr>
             <a:picLocks noChangeAspect="1" noChangeArrowheads="1"/>
           </p:cNvPicPr>
@@ -3469,7 +3469,7 @@
         </p:blipFill>
         <p:spPr bwMode="auto">
           <a:xfrm>
-            <a:off x="-27384" y="1187046"/>
+            <a:off x="245492" y="1187046"/>
             <a:ext cx="6055568" cy="4037977"/>
           </a:xfrm>
           <a:prstGeom prst="rect">
@@ -3502,7 +3502,7 @@
       </p:pic>
       <p:pic>
         <p:nvPicPr>
-          <p:cNvPr id="170" name="Picture 3"/>
+          <p:cNvPr id="27" name="Picture 3"/>
           <p:cNvPicPr>
             <a:picLocks noChangeAspect="1" noChangeArrowheads="1"/>
           </p:cNvPicPr>
@@ -3521,7 +3521,7 @@
         </p:blipFill>
         <p:spPr bwMode="auto">
           <a:xfrm>
-            <a:off x="2494383" y="1454170"/>
+            <a:off x="2767259" y="1454170"/>
             <a:ext cx="2562226" cy="2638816"/>
           </a:xfrm>
           <a:prstGeom prst="rect">
@@ -3554,13 +3554,13 @@
       </p:pic>
       <p:cxnSp>
         <p:nvCxnSpPr>
-          <p:cNvPr id="171" name="Connecteur droit 170"/>
+          <p:cNvPr id="28" name="Connecteur droit 27"/>
           <p:cNvCxnSpPr/>
           <p:nvPr/>
         </p:nvCxnSpPr>
         <p:spPr>
           <a:xfrm>
-            <a:off x="623764" y="707653"/>
+            <a:off x="896640" y="707653"/>
             <a:ext cx="1077044" cy="0"/>
           </a:xfrm>
           <a:prstGeom prst="line">
@@ -3584,13 +3584,13 @@
       </p:cxnSp>
       <p:cxnSp>
         <p:nvCxnSpPr>
-          <p:cNvPr id="172" name="Connecteur droit 171"/>
+          <p:cNvPr id="29" name="Connecteur droit 28"/>
           <p:cNvCxnSpPr/>
           <p:nvPr/>
         </p:nvCxnSpPr>
         <p:spPr>
           <a:xfrm>
-            <a:off x="1700808" y="707653"/>
+            <a:off x="1973684" y="707653"/>
             <a:ext cx="0" cy="360040"/>
           </a:xfrm>
           <a:prstGeom prst="line">
@@ -3614,13 +3614,13 @@
       </p:cxnSp>
       <p:cxnSp>
         <p:nvCxnSpPr>
-          <p:cNvPr id="173" name="Connecteur droit 172"/>
+          <p:cNvPr id="30" name="Connecteur droit 29"/>
           <p:cNvCxnSpPr/>
           <p:nvPr/>
         </p:nvCxnSpPr>
         <p:spPr>
           <a:xfrm>
-            <a:off x="1860476" y="707653"/>
+            <a:off x="2133352" y="707653"/>
             <a:ext cx="0" cy="360040"/>
           </a:xfrm>
           <a:prstGeom prst="line">
@@ -3644,13 +3644,13 @@
       </p:cxnSp>
       <p:cxnSp>
         <p:nvCxnSpPr>
-          <p:cNvPr id="174" name="Connecteur droit 173"/>
+          <p:cNvPr id="31" name="Connecteur droit 30"/>
           <p:cNvCxnSpPr/>
           <p:nvPr/>
         </p:nvCxnSpPr>
         <p:spPr>
           <a:xfrm>
-            <a:off x="1860476" y="707653"/>
+            <a:off x="2133352" y="707653"/>
             <a:ext cx="4060229" cy="0"/>
           </a:xfrm>
           <a:prstGeom prst="line">
@@ -3674,13 +3674,13 @@
       </p:cxnSp>
       <p:cxnSp>
         <p:nvCxnSpPr>
-          <p:cNvPr id="175" name="Connecteur droit 174"/>
+          <p:cNvPr id="32" name="Connecteur droit 31"/>
           <p:cNvCxnSpPr/>
           <p:nvPr/>
         </p:nvCxnSpPr>
         <p:spPr>
           <a:xfrm>
-            <a:off x="1700808" y="1070318"/>
+            <a:off x="1973684" y="1070318"/>
             <a:ext cx="159668" cy="0"/>
           </a:xfrm>
           <a:prstGeom prst="line">
@@ -3704,13 +3704,13 @@
       </p:cxnSp>
       <p:cxnSp>
         <p:nvCxnSpPr>
-          <p:cNvPr id="176" name="Connecteur droit 175"/>
+          <p:cNvPr id="33" name="Connecteur droit 32"/>
           <p:cNvCxnSpPr/>
           <p:nvPr/>
         </p:nvCxnSpPr>
         <p:spPr>
           <a:xfrm>
-            <a:off x="1384201" y="707653"/>
+            <a:off x="1657077" y="707653"/>
             <a:ext cx="0" cy="360040"/>
           </a:xfrm>
           <a:prstGeom prst="line">
@@ -3734,13 +3734,13 @@
       </p:cxnSp>
       <p:cxnSp>
         <p:nvCxnSpPr>
-          <p:cNvPr id="177" name="Connecteur droit 176"/>
+          <p:cNvPr id="34" name="Connecteur droit 33"/>
           <p:cNvCxnSpPr/>
           <p:nvPr/>
         </p:nvCxnSpPr>
         <p:spPr>
           <a:xfrm>
-            <a:off x="5344641" y="707653"/>
+            <a:off x="5617517" y="707653"/>
             <a:ext cx="0" cy="360040"/>
           </a:xfrm>
           <a:prstGeom prst="line">
@@ -3764,13 +3764,13 @@
       </p:cxnSp>
       <p:sp>
         <p:nvSpPr>
-          <p:cNvPr id="178" name="ZoneTexte 177"/>
+          <p:cNvPr id="35" name="ZoneTexte 34"/>
           <p:cNvSpPr txBox="1"/>
           <p:nvPr/>
         </p:nvSpPr>
         <p:spPr>
           <a:xfrm>
-            <a:off x="765498" y="635645"/>
+            <a:off x="1038374" y="635645"/>
             <a:ext cx="437940" cy="338554"/>
           </a:xfrm>
           <a:prstGeom prst="rect">
@@ -3806,13 +3806,13 @@
       </p:sp>
       <p:sp>
         <p:nvSpPr>
-          <p:cNvPr id="179" name="ZoneTexte 178"/>
+          <p:cNvPr id="36" name="ZoneTexte 35"/>
           <p:cNvSpPr txBox="1"/>
           <p:nvPr/>
         </p:nvSpPr>
         <p:spPr>
           <a:xfrm>
-            <a:off x="5416649" y="635645"/>
+            <a:off x="5689525" y="635645"/>
             <a:ext cx="437940" cy="338554"/>
           </a:xfrm>
           <a:prstGeom prst="rect">
@@ -3848,13 +3848,13 @@
       </p:sp>
       <p:sp>
         <p:nvSpPr>
-          <p:cNvPr id="180" name="ZoneTexte 179"/>
+          <p:cNvPr id="37" name="ZoneTexte 36"/>
           <p:cNvSpPr txBox="1"/>
           <p:nvPr/>
         </p:nvSpPr>
         <p:spPr>
           <a:xfrm>
-            <a:off x="3184401" y="635645"/>
+            <a:off x="3457277" y="635645"/>
             <a:ext cx="588623" cy="338554"/>
           </a:xfrm>
           <a:prstGeom prst="rect">
@@ -3890,13 +3890,13 @@
       </p:sp>
       <p:cxnSp>
         <p:nvCxnSpPr>
-          <p:cNvPr id="181" name="Connecteur droit 180"/>
+          <p:cNvPr id="38" name="Connecteur droit 37"/>
           <p:cNvCxnSpPr/>
           <p:nvPr/>
         </p:nvCxnSpPr>
         <p:spPr>
           <a:xfrm>
-            <a:off x="623764" y="248166"/>
+            <a:off x="896640" y="248166"/>
             <a:ext cx="1077044" cy="0"/>
           </a:xfrm>
           <a:prstGeom prst="line">
@@ -3925,13 +3925,13 @@
       </p:cxnSp>
       <p:cxnSp>
         <p:nvCxnSpPr>
-          <p:cNvPr id="182" name="Connecteur droit 181"/>
+          <p:cNvPr id="39" name="Connecteur droit 38"/>
           <p:cNvCxnSpPr/>
           <p:nvPr/>
         </p:nvCxnSpPr>
         <p:spPr>
           <a:xfrm>
-            <a:off x="1700808" y="248166"/>
+            <a:off x="1973684" y="248166"/>
             <a:ext cx="0" cy="360040"/>
           </a:xfrm>
           <a:prstGeom prst="line">
@@ -3960,13 +3960,13 @@
       </p:cxnSp>
       <p:cxnSp>
         <p:nvCxnSpPr>
-          <p:cNvPr id="183" name="Connecteur droit 182"/>
+          <p:cNvPr id="40" name="Connecteur droit 39"/>
           <p:cNvCxnSpPr/>
           <p:nvPr/>
         </p:nvCxnSpPr>
         <p:spPr>
           <a:xfrm>
-            <a:off x="1860476" y="248166"/>
+            <a:off x="2133352" y="248166"/>
             <a:ext cx="0" cy="360040"/>
           </a:xfrm>
           <a:prstGeom prst="line">
@@ -3995,13 +3995,13 @@
       </p:cxnSp>
       <p:cxnSp>
         <p:nvCxnSpPr>
-          <p:cNvPr id="184" name="Connecteur droit 183"/>
+          <p:cNvPr id="41" name="Connecteur droit 40"/>
           <p:cNvCxnSpPr/>
           <p:nvPr/>
         </p:nvCxnSpPr>
         <p:spPr>
           <a:xfrm>
-            <a:off x="1860476" y="248166"/>
+            <a:off x="2133352" y="248166"/>
             <a:ext cx="4060229" cy="0"/>
           </a:xfrm>
           <a:prstGeom prst="line">
@@ -4030,13 +4030,13 @@
       </p:cxnSp>
       <p:cxnSp>
         <p:nvCxnSpPr>
-          <p:cNvPr id="185" name="Connecteur droit 184"/>
+          <p:cNvPr id="42" name="Connecteur droit 41"/>
           <p:cNvCxnSpPr/>
           <p:nvPr/>
         </p:nvCxnSpPr>
         <p:spPr>
           <a:xfrm>
-            <a:off x="1700808" y="608206"/>
+            <a:off x="1973684" y="608206"/>
             <a:ext cx="159668" cy="0"/>
           </a:xfrm>
           <a:prstGeom prst="line">
@@ -4065,13 +4065,13 @@
       </p:cxnSp>
       <p:cxnSp>
         <p:nvCxnSpPr>
-          <p:cNvPr id="186" name="Connecteur droit 185"/>
+          <p:cNvPr id="43" name="Connecteur droit 42"/>
           <p:cNvCxnSpPr/>
           <p:nvPr/>
         </p:nvCxnSpPr>
         <p:spPr>
           <a:xfrm>
-            <a:off x="1744241" y="248166"/>
+            <a:off x="2017117" y="248166"/>
             <a:ext cx="0" cy="360040"/>
           </a:xfrm>
           <a:prstGeom prst="line">
@@ -4101,13 +4101,13 @@
       </p:cxnSp>
       <p:cxnSp>
         <p:nvCxnSpPr>
-          <p:cNvPr id="187" name="Connecteur droit 186"/>
+          <p:cNvPr id="44" name="Connecteur droit 43"/>
           <p:cNvCxnSpPr/>
           <p:nvPr/>
         </p:nvCxnSpPr>
         <p:spPr>
           <a:xfrm>
-            <a:off x="5344641" y="248166"/>
+            <a:off x="5617517" y="248166"/>
             <a:ext cx="0" cy="360040"/>
           </a:xfrm>
           <a:prstGeom prst="line">
@@ -4136,13 +4136,13 @@
       </p:cxnSp>
       <p:sp>
         <p:nvSpPr>
-          <p:cNvPr id="188" name="ZoneTexte 187"/>
+          <p:cNvPr id="45" name="ZoneTexte 44"/>
           <p:cNvSpPr txBox="1"/>
           <p:nvPr/>
         </p:nvSpPr>
         <p:spPr>
           <a:xfrm>
-            <a:off x="765498" y="176158"/>
+            <a:off x="1038374" y="176158"/>
             <a:ext cx="437940" cy="338554"/>
           </a:xfrm>
           <a:prstGeom prst="rect">
@@ -4190,13 +4190,13 @@
       </p:sp>
       <p:sp>
         <p:nvSpPr>
-          <p:cNvPr id="189" name="ZoneTexte 188"/>
+          <p:cNvPr id="46" name="ZoneTexte 45"/>
           <p:cNvSpPr txBox="1"/>
           <p:nvPr/>
         </p:nvSpPr>
         <p:spPr>
           <a:xfrm>
-            <a:off x="5416649" y="176158"/>
+            <a:off x="5689525" y="176158"/>
             <a:ext cx="437940" cy="338554"/>
           </a:xfrm>
           <a:prstGeom prst="rect">
@@ -4244,13 +4244,13 @@
       </p:sp>
       <p:sp>
         <p:nvSpPr>
-          <p:cNvPr id="190" name="ZoneTexte 189"/>
+          <p:cNvPr id="47" name="ZoneTexte 46"/>
           <p:cNvSpPr txBox="1"/>
           <p:nvPr/>
         </p:nvSpPr>
         <p:spPr>
           <a:xfrm>
-            <a:off x="3184401" y="176158"/>
+            <a:off x="3457277" y="176158"/>
             <a:ext cx="588623" cy="338554"/>
           </a:xfrm>
           <a:prstGeom prst="rect">
@@ -4298,13 +4298,13 @@
       </p:sp>
       <p:sp>
         <p:nvSpPr>
-          <p:cNvPr id="191" name="ZoneTexte 190"/>
+          <p:cNvPr id="48" name="ZoneTexte 47"/>
           <p:cNvSpPr txBox="1"/>
           <p:nvPr/>
         </p:nvSpPr>
         <p:spPr>
           <a:xfrm>
-            <a:off x="1521596" y="-108520"/>
+            <a:off x="1794472" y="-108520"/>
             <a:ext cx="518091" cy="338554"/>
           </a:xfrm>
           <a:prstGeom prst="rect">
@@ -4332,6 +4332,174 @@
               <a:t>dark</a:t>
             </a:r>
             <a:endParaRPr lang="en-US" sz="1600" baseline="-25000" dirty="0">
+              <a:latin typeface="Times New Roman" panose="02020603050405020304" pitchFamily="18" charset="0"/>
+              <a:cs typeface="Times New Roman" panose="02020603050405020304" pitchFamily="18" charset="0"/>
+            </a:endParaRPr>
+          </a:p>
+        </p:txBody>
+      </p:sp>
+      <p:sp>
+        <p:nvSpPr>
+          <p:cNvPr id="49" name="ZoneTexte 48"/>
+          <p:cNvSpPr txBox="1"/>
+          <p:nvPr/>
+        </p:nvSpPr>
+        <p:spPr>
+          <a:xfrm>
+            <a:off x="54050" y="125859"/>
+            <a:ext cx="787395" cy="276999"/>
+          </a:xfrm>
+          <a:prstGeom prst="rect">
+            <a:avLst/>
+          </a:prstGeom>
+          <a:noFill/>
+          <a:ln>
+            <a:noFill/>
+          </a:ln>
+        </p:spPr>
+        <p:txBody>
+          <a:bodyPr wrap="none" rtlCol="0">
+            <a:spAutoFit/>
+          </a:bodyPr>
+          <a:lstStyle/>
+          <a:p>
+            <a:r>
+              <a:rPr lang="fr-FR" sz="1200" dirty="0" smtClean="0">
+                <a:solidFill>
+                  <a:srgbClr val="FF0000"/>
+                </a:solidFill>
+                <a:latin typeface="Times New Roman" panose="02020603050405020304" pitchFamily="18" charset="0"/>
+                <a:cs typeface="Times New Roman" panose="02020603050405020304" pitchFamily="18" charset="0"/>
+              </a:rPr>
+              <a:t>Laser ON</a:t>
+            </a:r>
+            <a:endParaRPr lang="en-US" sz="1200" baseline="-25000" dirty="0">
+              <a:solidFill>
+                <a:srgbClr val="FF0000"/>
+              </a:solidFill>
+              <a:latin typeface="Times New Roman" panose="02020603050405020304" pitchFamily="18" charset="0"/>
+              <a:cs typeface="Times New Roman" panose="02020603050405020304" pitchFamily="18" charset="0"/>
+            </a:endParaRPr>
+          </a:p>
+        </p:txBody>
+      </p:sp>
+      <p:sp>
+        <p:nvSpPr>
+          <p:cNvPr id="50" name="ZoneTexte 49"/>
+          <p:cNvSpPr txBox="1"/>
+          <p:nvPr/>
+        </p:nvSpPr>
+        <p:spPr>
+          <a:xfrm>
+            <a:off x="54050" y="341883"/>
+            <a:ext cx="846707" cy="276999"/>
+          </a:xfrm>
+          <a:prstGeom prst="rect">
+            <a:avLst/>
+          </a:prstGeom>
+          <a:noFill/>
+          <a:ln>
+            <a:noFill/>
+          </a:ln>
+        </p:spPr>
+        <p:txBody>
+          <a:bodyPr wrap="none" rtlCol="0">
+            <a:spAutoFit/>
+          </a:bodyPr>
+          <a:lstStyle/>
+          <a:p>
+            <a:r>
+              <a:rPr lang="fr-FR" sz="1200" dirty="0" smtClean="0">
+                <a:solidFill>
+                  <a:srgbClr val="FF0000"/>
+                </a:solidFill>
+                <a:latin typeface="Times New Roman" panose="02020603050405020304" pitchFamily="18" charset="0"/>
+                <a:cs typeface="Times New Roman" panose="02020603050405020304" pitchFamily="18" charset="0"/>
+              </a:rPr>
+              <a:t>Laser OFF</a:t>
+            </a:r>
+            <a:endParaRPr lang="en-US" sz="1200" baseline="-25000" dirty="0">
+              <a:solidFill>
+                <a:srgbClr val="FF0000"/>
+              </a:solidFill>
+              <a:latin typeface="Times New Roman" panose="02020603050405020304" pitchFamily="18" charset="0"/>
+              <a:cs typeface="Times New Roman" panose="02020603050405020304" pitchFamily="18" charset="0"/>
+            </a:endParaRPr>
+          </a:p>
+        </p:txBody>
+      </p:sp>
+      <p:sp>
+        <p:nvSpPr>
+          <p:cNvPr id="51" name="ZoneTexte 50"/>
+          <p:cNvSpPr txBox="1"/>
+          <p:nvPr/>
+        </p:nvSpPr>
+        <p:spPr>
+          <a:xfrm>
+            <a:off x="58743" y="568940"/>
+            <a:ext cx="787395" cy="276999"/>
+          </a:xfrm>
+          <a:prstGeom prst="rect">
+            <a:avLst/>
+          </a:prstGeom>
+          <a:noFill/>
+          <a:ln>
+            <a:noFill/>
+          </a:ln>
+        </p:spPr>
+        <p:txBody>
+          <a:bodyPr wrap="none" rtlCol="0">
+            <a:spAutoFit/>
+          </a:bodyPr>
+          <a:lstStyle/>
+          <a:p>
+            <a:r>
+              <a:rPr lang="fr-FR" sz="1200" dirty="0" smtClean="0">
+                <a:latin typeface="Times New Roman" panose="02020603050405020304" pitchFamily="18" charset="0"/>
+                <a:cs typeface="Times New Roman" panose="02020603050405020304" pitchFamily="18" charset="0"/>
+              </a:rPr>
+              <a:t>Laser ON</a:t>
+            </a:r>
+            <a:endParaRPr lang="en-US" sz="1200" baseline="-25000" dirty="0">
+              <a:latin typeface="Times New Roman" panose="02020603050405020304" pitchFamily="18" charset="0"/>
+              <a:cs typeface="Times New Roman" panose="02020603050405020304" pitchFamily="18" charset="0"/>
+            </a:endParaRPr>
+          </a:p>
+        </p:txBody>
+      </p:sp>
+      <p:sp>
+        <p:nvSpPr>
+          <p:cNvPr id="52" name="ZoneTexte 51"/>
+          <p:cNvSpPr txBox="1"/>
+          <p:nvPr/>
+        </p:nvSpPr>
+        <p:spPr>
+          <a:xfrm>
+            <a:off x="71439" y="845939"/>
+            <a:ext cx="846707" cy="276999"/>
+          </a:xfrm>
+          <a:prstGeom prst="rect">
+            <a:avLst/>
+          </a:prstGeom>
+          <a:noFill/>
+          <a:ln>
+            <a:noFill/>
+          </a:ln>
+        </p:spPr>
+        <p:txBody>
+          <a:bodyPr wrap="none" rtlCol="0">
+            <a:spAutoFit/>
+          </a:bodyPr>
+          <a:lstStyle/>
+          <a:p>
+            <a:r>
+              <a:rPr lang="fr-FR" sz="1200" dirty="0" smtClean="0">
+                <a:latin typeface="Times New Roman" panose="02020603050405020304" pitchFamily="18" charset="0"/>
+                <a:cs typeface="Times New Roman" panose="02020603050405020304" pitchFamily="18" charset="0"/>
+              </a:rPr>
+              <a:t>Laser OFF</a:t>
+            </a:r>
+            <a:endParaRPr lang="en-US" sz="1200" baseline="-25000" dirty="0">
               <a:latin typeface="Times New Roman" panose="02020603050405020304" pitchFamily="18" charset="0"/>
               <a:cs typeface="Times New Roman" panose="02020603050405020304" pitchFamily="18" charset="0"/>
             </a:endParaRPr>

</xml_diff>